<commit_message>
updates to slides for RDU CodeCamp
</commit_message>
<xml_diff>
--- a/Presentations/DataSetsCodeLessDoMore/DataSets.pptx
+++ b/Presentations/DataSetsCodeLessDoMore/DataSets.pptx
@@ -7,8 +7,10 @@
   </p:sldMasterIdLst>
   <p:sldIdLst>
     <p:sldId id="256" r:id="rId3"/>
-    <p:sldId id="258" r:id="rId4"/>
-    <p:sldId id="257" r:id="rId5"/>
+    <p:sldId id="259" r:id="rId4"/>
+    <p:sldId id="260" r:id="rId5"/>
+    <p:sldId id="258" r:id="rId6"/>
+    <p:sldId id="257" r:id="rId7"/>
   </p:sldIdLst>
   <p:sldSz cx="9144000" cy="6858000" type="screen4x3"/>
   <p:notesSz cx="6858000" cy="9144000"/>
@@ -291,7 +293,8 @@
           <a:p>
             <a:fld id="{7613D840-5E73-4CD1-942B-CAB9C646F7AC}" type="datetimeFigureOut">
               <a:rPr lang="en-US" smtClean="0"/>
-              <a:t>2/19/2008</a:t>
+              <a:pPr/>
+              <a:t>9/18/2009</a:t>
             </a:fld>
             <a:endParaRPr lang="en-US"/>
           </a:p>
@@ -333,6 +336,7 @@
           <a:p>
             <a:fld id="{BAB9469A-DB4A-481F-A3AB-0B138C3BF7C1}" type="slidenum">
               <a:rPr lang="en-US" smtClean="0"/>
+              <a:pPr/>
               <a:t>‹#›</a:t>
             </a:fld>
             <a:endParaRPr lang="en-US"/>
@@ -456,7 +460,8 @@
           <a:p>
             <a:fld id="{7613D840-5E73-4CD1-942B-CAB9C646F7AC}" type="datetimeFigureOut">
               <a:rPr lang="en-US" smtClean="0"/>
-              <a:t>2/19/2008</a:t>
+              <a:pPr/>
+              <a:t>9/18/2009</a:t>
             </a:fld>
             <a:endParaRPr lang="en-US"/>
           </a:p>
@@ -498,6 +503,7 @@
           <a:p>
             <a:fld id="{BAB9469A-DB4A-481F-A3AB-0B138C3BF7C1}" type="slidenum">
               <a:rPr lang="en-US" smtClean="0"/>
+              <a:pPr/>
               <a:t>‹#›</a:t>
             </a:fld>
             <a:endParaRPr lang="en-US"/>
@@ -631,7 +637,8 @@
           <a:p>
             <a:fld id="{7613D840-5E73-4CD1-942B-CAB9C646F7AC}" type="datetimeFigureOut">
               <a:rPr lang="en-US" smtClean="0"/>
-              <a:t>2/19/2008</a:t>
+              <a:pPr/>
+              <a:t>9/18/2009</a:t>
             </a:fld>
             <a:endParaRPr lang="en-US"/>
           </a:p>
@@ -673,6 +680,7 @@
           <a:p>
             <a:fld id="{BAB9469A-DB4A-481F-A3AB-0B138C3BF7C1}" type="slidenum">
               <a:rPr lang="en-US" smtClean="0"/>
+              <a:pPr/>
               <a:t>‹#›</a:t>
             </a:fld>
             <a:endParaRPr lang="en-US"/>
@@ -879,7 +887,7 @@
                 <a:cs typeface="+mn-cs"/>
               </a:rPr>
               <a:pPr algn="l" rtl="0"/>
-              <a:t>2/19/2008</a:t>
+              <a:t>9/18/2009</a:t>
             </a:fld>
             <a:endParaRPr lang="en-US" sz="1200" kern="1200" dirty="0">
               <a:solidFill>
@@ -1094,7 +1102,7 @@
                 <a:cs typeface="+mn-cs"/>
               </a:rPr>
               <a:pPr algn="l" rtl="0"/>
-              <a:t>2/19/2008</a:t>
+              <a:t>9/18/2009</a:t>
             </a:fld>
             <a:endParaRPr lang="en-US" sz="1200" kern="1200" dirty="0">
               <a:solidFill>
@@ -1385,7 +1393,7 @@
                 <a:cs typeface="+mn-cs"/>
               </a:rPr>
               <a:pPr algn="l" rtl="0"/>
-              <a:t>2/19/2008</a:t>
+              <a:t>9/18/2009</a:t>
             </a:fld>
             <a:endParaRPr lang="en-US" sz="1200" kern="1200" dirty="0">
               <a:solidFill>
@@ -1718,7 +1726,7 @@
                 <a:cs typeface="+mn-cs"/>
               </a:rPr>
               <a:pPr algn="l" rtl="0"/>
-              <a:t>2/19/2008</a:t>
+              <a:t>9/18/2009</a:t>
             </a:fld>
             <a:endParaRPr lang="en-US" sz="1200" kern="1200" dirty="0">
               <a:solidFill>
@@ -2185,7 +2193,7 @@
                 <a:cs typeface="+mn-cs"/>
               </a:rPr>
               <a:pPr algn="l" rtl="0"/>
-              <a:t>2/19/2008</a:t>
+              <a:t>9/18/2009</a:t>
             </a:fld>
             <a:endParaRPr lang="en-US" sz="1200" kern="1200" dirty="0">
               <a:solidFill>
@@ -2348,7 +2356,7 @@
                 <a:cs typeface="+mn-cs"/>
               </a:rPr>
               <a:pPr algn="l" rtl="0"/>
-              <a:t>2/19/2008</a:t>
+              <a:t>9/18/2009</a:t>
             </a:fld>
             <a:endParaRPr lang="en-US" sz="1200" kern="1200" dirty="0">
               <a:solidFill>
@@ -2488,7 +2496,7 @@
                 <a:cs typeface="+mn-cs"/>
               </a:rPr>
               <a:pPr algn="l" rtl="0"/>
-              <a:t>2/19/2008</a:t>
+              <a:t>9/18/2009</a:t>
             </a:fld>
             <a:endParaRPr lang="en-US" sz="1200" kern="1200" dirty="0">
               <a:solidFill>
@@ -2810,7 +2818,7 @@
                 <a:cs typeface="+mn-cs"/>
               </a:rPr>
               <a:pPr algn="l" rtl="0"/>
-              <a:t>2/19/2008</a:t>
+              <a:t>9/18/2009</a:t>
             </a:fld>
             <a:endParaRPr lang="en-US" sz="1200" kern="1200" dirty="0">
               <a:solidFill>
@@ -3014,7 +3022,8 @@
           <a:p>
             <a:fld id="{7613D840-5E73-4CD1-942B-CAB9C646F7AC}" type="datetimeFigureOut">
               <a:rPr lang="en-US" smtClean="0"/>
-              <a:t>2/19/2008</a:t>
+              <a:pPr/>
+              <a:t>9/18/2009</a:t>
             </a:fld>
             <a:endParaRPr lang="en-US"/>
           </a:p>
@@ -3056,6 +3065,7 @@
           <a:p>
             <a:fld id="{BAB9469A-DB4A-481F-A3AB-0B138C3BF7C1}" type="slidenum">
               <a:rPr lang="en-US" smtClean="0"/>
+              <a:pPr/>
               <a:t>‹#›</a:t>
             </a:fld>
             <a:endParaRPr lang="en-US"/>
@@ -3273,7 +3283,7 @@
                 <a:cs typeface="+mn-cs"/>
               </a:rPr>
               <a:pPr algn="l" rtl="0"/>
-              <a:t>2/19/2008</a:t>
+              <a:t>9/18/2009</a:t>
             </a:fld>
             <a:endParaRPr lang="en-US" sz="1200" kern="1200" dirty="0">
               <a:solidFill>
@@ -3488,7 +3498,7 @@
                 <a:cs typeface="+mn-cs"/>
               </a:rPr>
               <a:pPr algn="l" rtl="0"/>
-              <a:t>2/19/2008</a:t>
+              <a:t>9/18/2009</a:t>
             </a:fld>
             <a:endParaRPr lang="en-US" sz="1200" kern="1200" dirty="0">
               <a:solidFill>
@@ -3713,7 +3723,7 @@
                 <a:cs typeface="+mn-cs"/>
               </a:rPr>
               <a:pPr algn="l" rtl="0"/>
-              <a:t>2/19/2008</a:t>
+              <a:t>9/18/2009</a:t>
             </a:fld>
             <a:endParaRPr lang="en-US" sz="1200" kern="1200" dirty="0">
               <a:solidFill>
@@ -3993,7 +4003,8 @@
           <a:p>
             <a:fld id="{7613D840-5E73-4CD1-942B-CAB9C646F7AC}" type="datetimeFigureOut">
               <a:rPr lang="en-US" smtClean="0"/>
-              <a:t>2/19/2008</a:t>
+              <a:pPr/>
+              <a:t>9/18/2009</a:t>
             </a:fld>
             <a:endParaRPr lang="en-US"/>
           </a:p>
@@ -4035,6 +4046,7 @@
           <a:p>
             <a:fld id="{BAB9469A-DB4A-481F-A3AB-0B138C3BF7C1}" type="slidenum">
               <a:rPr lang="en-US" smtClean="0"/>
+              <a:pPr/>
               <a:t>‹#›</a:t>
             </a:fld>
             <a:endParaRPr lang="en-US"/>
@@ -4276,7 +4288,8 @@
           <a:p>
             <a:fld id="{7613D840-5E73-4CD1-942B-CAB9C646F7AC}" type="datetimeFigureOut">
               <a:rPr lang="en-US" smtClean="0"/>
-              <a:t>2/19/2008</a:t>
+              <a:pPr/>
+              <a:t>9/18/2009</a:t>
             </a:fld>
             <a:endParaRPr lang="en-US"/>
           </a:p>
@@ -4318,6 +4331,7 @@
           <a:p>
             <a:fld id="{BAB9469A-DB4A-481F-A3AB-0B138C3BF7C1}" type="slidenum">
               <a:rPr lang="en-US" smtClean="0"/>
+              <a:pPr/>
               <a:t>‹#›</a:t>
             </a:fld>
             <a:endParaRPr lang="en-US"/>
@@ -4693,7 +4707,8 @@
           <a:p>
             <a:fld id="{7613D840-5E73-4CD1-942B-CAB9C646F7AC}" type="datetimeFigureOut">
               <a:rPr lang="en-US" smtClean="0"/>
-              <a:t>2/19/2008</a:t>
+              <a:pPr/>
+              <a:t>9/18/2009</a:t>
             </a:fld>
             <a:endParaRPr lang="en-US"/>
           </a:p>
@@ -4735,6 +4750,7 @@
           <a:p>
             <a:fld id="{BAB9469A-DB4A-481F-A3AB-0B138C3BF7C1}" type="slidenum">
               <a:rPr lang="en-US" smtClean="0"/>
+              <a:pPr/>
               <a:t>‹#›</a:t>
             </a:fld>
             <a:endParaRPr lang="en-US"/>
@@ -4806,7 +4822,8 @@
           <a:p>
             <a:fld id="{7613D840-5E73-4CD1-942B-CAB9C646F7AC}" type="datetimeFigureOut">
               <a:rPr lang="en-US" smtClean="0"/>
-              <a:t>2/19/2008</a:t>
+              <a:pPr/>
+              <a:t>9/18/2009</a:t>
             </a:fld>
             <a:endParaRPr lang="en-US"/>
           </a:p>
@@ -4848,6 +4865,7 @@
           <a:p>
             <a:fld id="{BAB9469A-DB4A-481F-A3AB-0B138C3BF7C1}" type="slidenum">
               <a:rPr lang="en-US" smtClean="0"/>
+              <a:pPr/>
               <a:t>‹#›</a:t>
             </a:fld>
             <a:endParaRPr lang="en-US"/>
@@ -4896,7 +4914,8 @@
           <a:p>
             <a:fld id="{7613D840-5E73-4CD1-942B-CAB9C646F7AC}" type="datetimeFigureOut">
               <a:rPr lang="en-US" smtClean="0"/>
-              <a:t>2/19/2008</a:t>
+              <a:pPr/>
+              <a:t>9/18/2009</a:t>
             </a:fld>
             <a:endParaRPr lang="en-US"/>
           </a:p>
@@ -4938,6 +4957,7 @@
           <a:p>
             <a:fld id="{BAB9469A-DB4A-481F-A3AB-0B138C3BF7C1}" type="slidenum">
               <a:rPr lang="en-US" smtClean="0"/>
+              <a:pPr/>
               <a:t>‹#›</a:t>
             </a:fld>
             <a:endParaRPr lang="en-US"/>
@@ -5168,7 +5188,8 @@
           <a:p>
             <a:fld id="{7613D840-5E73-4CD1-942B-CAB9C646F7AC}" type="datetimeFigureOut">
               <a:rPr lang="en-US" smtClean="0"/>
-              <a:t>2/19/2008</a:t>
+              <a:pPr/>
+              <a:t>9/18/2009</a:t>
             </a:fld>
             <a:endParaRPr lang="en-US"/>
           </a:p>
@@ -5210,6 +5231,7 @@
           <a:p>
             <a:fld id="{BAB9469A-DB4A-481F-A3AB-0B138C3BF7C1}" type="slidenum">
               <a:rPr lang="en-US" smtClean="0"/>
+              <a:pPr/>
               <a:t>‹#›</a:t>
             </a:fld>
             <a:endParaRPr lang="en-US"/>
@@ -5416,7 +5438,8 @@
           <a:p>
             <a:fld id="{7613D840-5E73-4CD1-942B-CAB9C646F7AC}" type="datetimeFigureOut">
               <a:rPr lang="en-US" smtClean="0"/>
-              <a:t>2/19/2008</a:t>
+              <a:pPr/>
+              <a:t>9/18/2009</a:t>
             </a:fld>
             <a:endParaRPr lang="en-US"/>
           </a:p>
@@ -5458,6 +5481,7 @@
           <a:p>
             <a:fld id="{BAB9469A-DB4A-481F-A3AB-0B138C3BF7C1}" type="slidenum">
               <a:rPr lang="en-US" smtClean="0"/>
+              <a:pPr/>
               <a:t>‹#›</a:t>
             </a:fld>
             <a:endParaRPr lang="en-US"/>
@@ -5624,7 +5648,8 @@
           <a:p>
             <a:fld id="{7613D840-5E73-4CD1-942B-CAB9C646F7AC}" type="datetimeFigureOut">
               <a:rPr lang="en-US" smtClean="0"/>
-              <a:t>2/19/2008</a:t>
+              <a:pPr/>
+              <a:t>9/18/2009</a:t>
             </a:fld>
             <a:endParaRPr lang="en-US"/>
           </a:p>
@@ -5702,6 +5727,7 @@
           <a:p>
             <a:fld id="{BAB9469A-DB4A-481F-A3AB-0B138C3BF7C1}" type="slidenum">
               <a:rPr lang="en-US" smtClean="0"/>
+              <a:pPr/>
               <a:t>‹#›</a:t>
             </a:fld>
             <a:endParaRPr lang="en-US"/>
@@ -6140,7 +6166,7 @@
                 <a:cs typeface="+mn-cs"/>
               </a:rPr>
               <a:pPr rtl="0"/>
-              <a:t>2/19/2008</a:t>
+              <a:t>9/18/2009</a:t>
             </a:fld>
             <a:endParaRPr lang="en-US" kern="1200" dirty="0">
               <a:solidFill>
@@ -6644,8 +6670,8 @@
         </p:nvSpPr>
         <p:spPr>
           <a:xfrm>
-            <a:off x="1585317" y="5103674"/>
-            <a:ext cx="5973367" cy="1754326"/>
+            <a:off x="1405909" y="5103674"/>
+            <a:ext cx="6332183" cy="1754326"/>
           </a:xfrm>
           <a:prstGeom prst="rect">
             <a:avLst/>
@@ -6714,7 +6740,7 @@
                   </a:innerShdw>
                 </a:effectLst>
               </a:rPr>
-              <a:t>Michael </a:t>
+              <a:t>Michael C. </a:t>
             </a:r>
             <a:r>
               <a:rPr lang="en-US" sz="5400" b="1" cap="none" spc="50" dirty="0" smtClean="0">
@@ -6741,7 +6767,7 @@
                   </a:innerShdw>
                 </a:effectLst>
               </a:rPr>
-              <a:t>C. Neel</a:t>
+              <a:t>Neel MVP</a:t>
             </a:r>
             <a:endParaRPr lang="en-US" sz="5400" b="1" cap="none" spc="50" dirty="0">
               <a:ln w="13500">
@@ -6779,7 +6805,7 @@
           <p:nvPr/>
         </p:nvPicPr>
         <p:blipFill>
-          <a:blip r:embed="rId2"/>
+          <a:blip r:embed="rId2" cstate="print"/>
           <a:srcRect/>
           <a:stretch>
             <a:fillRect/>
@@ -6812,6 +6838,833 @@
 </file>
 
 <file path=ppt/slides/slide2.xml><?xml version="1.0" encoding="utf-8"?>
+<p:sld xmlns:a="http://schemas.openxmlformats.org/drawingml/2006/main" xmlns:r="http://schemas.openxmlformats.org/officeDocument/2006/relationships" xmlns:p="http://schemas.openxmlformats.org/presentationml/2006/main">
+  <p:cSld>
+    <p:bg>
+      <p:bgPr>
+        <a:solidFill>
+          <a:schemeClr val="tx1"/>
+        </a:solidFill>
+        <a:effectLst/>
+      </p:bgPr>
+    </p:bg>
+    <p:spTree>
+      <p:nvGrpSpPr>
+        <p:cNvPr id="1" name=""/>
+        <p:cNvGrpSpPr/>
+        <p:nvPr/>
+      </p:nvGrpSpPr>
+      <p:grpSpPr>
+        <a:xfrm>
+          <a:off x="0" y="0"/>
+          <a:ext cx="0" cy="0"/>
+          <a:chOff x="0" y="0"/>
+          <a:chExt cx="0" cy="0"/>
+        </a:xfrm>
+      </p:grpSpPr>
+      <p:sp>
+        <p:nvSpPr>
+          <p:cNvPr id="7" name="Rectangle 6"/>
+          <p:cNvSpPr/>
+          <p:nvPr/>
+        </p:nvSpPr>
+        <p:spPr>
+          <a:xfrm>
+            <a:off x="3421857" y="4795897"/>
+            <a:ext cx="5722143" cy="2062103"/>
+          </a:xfrm>
+          <a:prstGeom prst="rect">
+            <a:avLst/>
+          </a:prstGeom>
+          <a:noFill/>
+        </p:spPr>
+        <p:txBody>
+          <a:bodyPr wrap="none" lIns="91440" tIns="45720" rIns="91440" bIns="45720">
+            <a:spAutoFit/>
+          </a:bodyPr>
+          <a:lstStyle/>
+          <a:p>
+            <a:pPr algn="r"/>
+            <a:r>
+              <a:rPr lang="en-US" sz="4400" b="1" cap="none" spc="50" dirty="0" smtClean="0">
+                <a:ln w="13500">
+                  <a:solidFill>
+                    <a:schemeClr val="accent1">
+                      <a:shade val="2500"/>
+                      <a:alpha val="6500"/>
+                    </a:schemeClr>
+                  </a:solidFill>
+                  <a:prstDash val="solid"/>
+                </a:ln>
+                <a:solidFill>
+                  <a:schemeClr val="accent1">
+                    <a:tint val="3000"/>
+                    <a:alpha val="95000"/>
+                  </a:schemeClr>
+                </a:solidFill>
+                <a:effectLst>
+                  <a:innerShdw blurRad="50900" dist="38500" dir="13500000">
+                    <a:srgbClr val="000000">
+                      <a:alpha val="60000"/>
+                    </a:srgbClr>
+                  </a:innerShdw>
+                </a:effectLst>
+              </a:rPr>
+              <a:t>@</a:t>
+            </a:r>
+            <a:r>
+              <a:rPr lang="en-US" sz="4400" b="1" cap="none" spc="50" dirty="0" err="1" smtClean="0">
+                <a:ln w="13500">
+                  <a:solidFill>
+                    <a:schemeClr val="accent1">
+                      <a:shade val="2500"/>
+                      <a:alpha val="6500"/>
+                    </a:schemeClr>
+                  </a:solidFill>
+                  <a:prstDash val="solid"/>
+                </a:ln>
+                <a:solidFill>
+                  <a:schemeClr val="accent1">
+                    <a:tint val="3000"/>
+                    <a:alpha val="95000"/>
+                  </a:schemeClr>
+                </a:solidFill>
+                <a:effectLst>
+                  <a:innerShdw blurRad="50900" dist="38500" dir="13500000">
+                    <a:srgbClr val="000000">
+                      <a:alpha val="60000"/>
+                    </a:srgbClr>
+                  </a:innerShdw>
+                </a:effectLst>
+              </a:rPr>
+              <a:t>ViNull</a:t>
+            </a:r>
+            <a:endParaRPr lang="en-US" sz="4400" b="1" cap="none" spc="50" dirty="0" smtClean="0">
+              <a:ln w="13500">
+                <a:solidFill>
+                  <a:schemeClr val="accent1">
+                    <a:shade val="2500"/>
+                    <a:alpha val="6500"/>
+                  </a:schemeClr>
+                </a:solidFill>
+                <a:prstDash val="solid"/>
+              </a:ln>
+              <a:solidFill>
+                <a:schemeClr val="accent1">
+                  <a:tint val="3000"/>
+                  <a:alpha val="95000"/>
+                </a:schemeClr>
+              </a:solidFill>
+              <a:effectLst>
+                <a:innerShdw blurRad="50900" dist="38500" dir="13500000">
+                  <a:srgbClr val="000000">
+                    <a:alpha val="60000"/>
+                  </a:srgbClr>
+                </a:innerShdw>
+              </a:effectLst>
+            </a:endParaRPr>
+          </a:p>
+          <a:p>
+            <a:pPr algn="r"/>
+            <a:r>
+              <a:rPr lang="en-US" sz="4000" b="1" spc="50" dirty="0">
+                <a:ln w="13500">
+                  <a:solidFill>
+                    <a:schemeClr val="accent1">
+                      <a:shade val="2500"/>
+                      <a:alpha val="6500"/>
+                    </a:schemeClr>
+                  </a:solidFill>
+                  <a:prstDash val="solid"/>
+                </a:ln>
+                <a:solidFill>
+                  <a:schemeClr val="accent1">
+                    <a:tint val="3000"/>
+                    <a:alpha val="95000"/>
+                  </a:schemeClr>
+                </a:solidFill>
+                <a:effectLst>
+                  <a:innerShdw blurRad="50900" dist="38500" dir="13500000">
+                    <a:srgbClr val="000000">
+                      <a:alpha val="60000"/>
+                    </a:srgbClr>
+                  </a:innerShdw>
+                </a:effectLst>
+              </a:rPr>
+              <a:t>m</a:t>
+            </a:r>
+            <a:r>
+              <a:rPr lang="en-US" sz="4000" b="1" spc="50" dirty="0" smtClean="0">
+                <a:ln w="13500">
+                  <a:solidFill>
+                    <a:schemeClr val="accent1">
+                      <a:shade val="2500"/>
+                      <a:alpha val="6500"/>
+                    </a:schemeClr>
+                  </a:solidFill>
+                  <a:prstDash val="solid"/>
+                </a:ln>
+                <a:solidFill>
+                  <a:schemeClr val="accent1">
+                    <a:tint val="3000"/>
+                    <a:alpha val="95000"/>
+                  </a:schemeClr>
+                </a:solidFill>
+                <a:effectLst>
+                  <a:innerShdw blurRad="50900" dist="38500" dir="13500000">
+                    <a:srgbClr val="000000">
+                      <a:alpha val="60000"/>
+                    </a:srgbClr>
+                  </a:innerShdw>
+                </a:effectLst>
+              </a:rPr>
+              <a:t>ichael.neel@gmail.com</a:t>
+            </a:r>
+          </a:p>
+          <a:p>
+            <a:pPr algn="r"/>
+            <a:r>
+              <a:rPr lang="en-US" sz="4000" b="1" cap="none" spc="50" dirty="0" smtClean="0">
+                <a:ln w="13500">
+                  <a:solidFill>
+                    <a:schemeClr val="accent1">
+                      <a:shade val="2500"/>
+                      <a:alpha val="6500"/>
+                    </a:schemeClr>
+                  </a:solidFill>
+                  <a:prstDash val="solid"/>
+                </a:ln>
+                <a:solidFill>
+                  <a:schemeClr val="accent1">
+                    <a:tint val="3000"/>
+                    <a:alpha val="95000"/>
+                  </a:schemeClr>
+                </a:solidFill>
+                <a:effectLst>
+                  <a:innerShdw blurRad="50900" dist="38500" dir="13500000">
+                    <a:srgbClr val="000000">
+                      <a:alpha val="60000"/>
+                    </a:srgbClr>
+                  </a:innerShdw>
+                </a:effectLst>
+              </a:rPr>
+              <a:t>www.vinull.com</a:t>
+            </a:r>
+            <a:endParaRPr lang="en-US" sz="4000" b="1" cap="none" spc="50" dirty="0">
+              <a:ln w="13500">
+                <a:solidFill>
+                  <a:schemeClr val="accent1">
+                    <a:shade val="2500"/>
+                    <a:alpha val="6500"/>
+                  </a:schemeClr>
+                </a:solidFill>
+                <a:prstDash val="solid"/>
+              </a:ln>
+              <a:solidFill>
+                <a:schemeClr val="accent1">
+                  <a:tint val="3000"/>
+                  <a:alpha val="95000"/>
+                </a:schemeClr>
+              </a:solidFill>
+              <a:effectLst>
+                <a:innerShdw blurRad="50900" dist="38500" dir="13500000">
+                  <a:srgbClr val="000000">
+                    <a:alpha val="60000"/>
+                  </a:srgbClr>
+                </a:innerShdw>
+              </a:effectLst>
+            </a:endParaRPr>
+          </a:p>
+        </p:txBody>
+      </p:sp>
+      <p:pic>
+        <p:nvPicPr>
+          <p:cNvPr id="1027" name="Picture 3"/>
+          <p:cNvPicPr>
+            <a:picLocks noChangeAspect="1" noChangeArrowheads="1"/>
+          </p:cNvPicPr>
+          <p:nvPr/>
+        </p:nvPicPr>
+        <p:blipFill>
+          <a:blip r:embed="rId2" cstate="print"/>
+          <a:srcRect/>
+          <a:stretch>
+            <a:fillRect/>
+          </a:stretch>
+        </p:blipFill>
+        <p:spPr bwMode="auto">
+          <a:xfrm>
+            <a:off x="152400" y="76200"/>
+            <a:ext cx="2819400" cy="1486400"/>
+          </a:xfrm>
+          <a:prstGeom prst="rect">
+            <a:avLst/>
+          </a:prstGeom>
+          <a:noFill/>
+          <a:ln w="9525">
+            <a:noFill/>
+            <a:miter lim="800000"/>
+            <a:headEnd/>
+            <a:tailEnd/>
+          </a:ln>
+          <a:effectLst/>
+        </p:spPr>
+      </p:pic>
+      <p:pic>
+        <p:nvPicPr>
+          <p:cNvPr id="3" name="Picture 4"/>
+          <p:cNvPicPr>
+            <a:picLocks noChangeAspect="1" noChangeArrowheads="1"/>
+          </p:cNvPicPr>
+          <p:nvPr/>
+        </p:nvPicPr>
+        <p:blipFill>
+          <a:blip r:embed="rId3" cstate="print"/>
+          <a:srcRect/>
+          <a:stretch>
+            <a:fillRect/>
+          </a:stretch>
+        </p:blipFill>
+        <p:spPr bwMode="auto">
+          <a:xfrm>
+            <a:off x="3599657" y="349315"/>
+            <a:ext cx="2325687" cy="940171"/>
+          </a:xfrm>
+          <a:prstGeom prst="rect">
+            <a:avLst/>
+          </a:prstGeom>
+          <a:noFill/>
+          <a:ln w="9525">
+            <a:noFill/>
+            <a:miter lim="800000"/>
+            <a:headEnd/>
+            <a:tailEnd/>
+          </a:ln>
+          <a:effectLst/>
+        </p:spPr>
+      </p:pic>
+      <p:pic>
+        <p:nvPicPr>
+          <p:cNvPr id="1033" name="Picture 9" descr="C:\Users\Mike\Desktop\insiders.png"/>
+          <p:cNvPicPr>
+            <a:picLocks noChangeAspect="1" noChangeArrowheads="1"/>
+          </p:cNvPicPr>
+          <p:nvPr/>
+        </p:nvPicPr>
+        <p:blipFill>
+          <a:blip r:embed="rId4" cstate="print"/>
+          <a:srcRect/>
+          <a:stretch>
+            <a:fillRect/>
+          </a:stretch>
+        </p:blipFill>
+        <p:spPr bwMode="auto">
+          <a:xfrm>
+            <a:off x="6553200" y="393950"/>
+            <a:ext cx="2214274" cy="850900"/>
+          </a:xfrm>
+          <a:prstGeom prst="rect">
+            <a:avLst/>
+          </a:prstGeom>
+          <a:noFill/>
+        </p:spPr>
+      </p:pic>
+      <p:pic>
+        <p:nvPicPr>
+          <p:cNvPr id="1034" name="Picture 10"/>
+          <p:cNvPicPr>
+            <a:picLocks noChangeAspect="1" noChangeArrowheads="1"/>
+          </p:cNvPicPr>
+          <p:nvPr/>
+        </p:nvPicPr>
+        <p:blipFill>
+          <a:blip r:embed="rId5" cstate="print"/>
+          <a:srcRect/>
+          <a:stretch>
+            <a:fillRect/>
+          </a:stretch>
+        </p:blipFill>
+        <p:spPr bwMode="auto">
+          <a:xfrm rot="21238161">
+            <a:off x="228600" y="2266349"/>
+            <a:ext cx="1981200" cy="4358289"/>
+          </a:xfrm>
+          <a:prstGeom prst="rect">
+            <a:avLst/>
+          </a:prstGeom>
+          <a:noFill/>
+          <a:ln w="9525">
+            <a:noFill/>
+            <a:miter lim="800000"/>
+            <a:headEnd/>
+            <a:tailEnd/>
+          </a:ln>
+          <a:effectLst/>
+        </p:spPr>
+      </p:pic>
+      <p:sp>
+        <p:nvSpPr>
+          <p:cNvPr id="18" name="Rectangle 17"/>
+          <p:cNvSpPr/>
+          <p:nvPr/>
+        </p:nvSpPr>
+        <p:spPr>
+          <a:xfrm>
+            <a:off x="2362200" y="2057400"/>
+            <a:ext cx="5945090" cy="2339102"/>
+          </a:xfrm>
+          <a:prstGeom prst="rect">
+            <a:avLst/>
+          </a:prstGeom>
+          <a:noFill/>
+        </p:spPr>
+        <p:txBody>
+          <a:bodyPr wrap="none" lIns="91440" tIns="45720" rIns="91440" bIns="45720">
+            <a:spAutoFit/>
+          </a:bodyPr>
+          <a:lstStyle/>
+          <a:p>
+            <a:pPr algn="ctr"/>
+            <a:r>
+              <a:rPr lang="en-US" sz="6600" b="1" cap="none" spc="50" dirty="0" err="1" smtClean="0">
+                <a:ln w="13500">
+                  <a:solidFill>
+                    <a:schemeClr val="accent1">
+                      <a:shade val="2500"/>
+                      <a:alpha val="6500"/>
+                    </a:schemeClr>
+                  </a:solidFill>
+                  <a:prstDash val="solid"/>
+                </a:ln>
+                <a:solidFill>
+                  <a:schemeClr val="accent1">
+                    <a:tint val="3000"/>
+                    <a:alpha val="95000"/>
+                  </a:schemeClr>
+                </a:solidFill>
+                <a:effectLst>
+                  <a:innerShdw blurRad="50900" dist="38500" dir="13500000">
+                    <a:srgbClr val="000000">
+                      <a:alpha val="60000"/>
+                    </a:srgbClr>
+                  </a:innerShdw>
+                </a:effectLst>
+              </a:rPr>
+              <a:t>FuncWorks</a:t>
+            </a:r>
+            <a:r>
+              <a:rPr lang="en-US" sz="6600" b="1" cap="none" spc="50" dirty="0" smtClean="0">
+                <a:ln w="13500">
+                  <a:solidFill>
+                    <a:schemeClr val="accent1">
+                      <a:shade val="2500"/>
+                      <a:alpha val="6500"/>
+                    </a:schemeClr>
+                  </a:solidFill>
+                  <a:prstDash val="solid"/>
+                </a:ln>
+                <a:solidFill>
+                  <a:schemeClr val="accent1">
+                    <a:tint val="3000"/>
+                    <a:alpha val="95000"/>
+                  </a:schemeClr>
+                </a:solidFill>
+                <a:effectLst>
+                  <a:innerShdw blurRad="50900" dist="38500" dir="13500000">
+                    <a:srgbClr val="000000">
+                      <a:alpha val="60000"/>
+                    </a:srgbClr>
+                  </a:innerShdw>
+                </a:effectLst>
+              </a:rPr>
+              <a:t>, LLC.</a:t>
+            </a:r>
+          </a:p>
+          <a:p>
+            <a:pPr algn="ctr"/>
+            <a:r>
+              <a:rPr lang="en-US" sz="4000" b="1" spc="50" dirty="0" smtClean="0">
+                <a:ln w="13500">
+                  <a:solidFill>
+                    <a:schemeClr val="accent1">
+                      <a:shade val="2500"/>
+                      <a:alpha val="6500"/>
+                    </a:schemeClr>
+                  </a:solidFill>
+                  <a:prstDash val="solid"/>
+                </a:ln>
+                <a:solidFill>
+                  <a:schemeClr val="accent1">
+                    <a:tint val="3000"/>
+                    <a:alpha val="95000"/>
+                  </a:schemeClr>
+                </a:solidFill>
+                <a:effectLst>
+                  <a:innerShdw blurRad="50900" dist="38500" dir="13500000">
+                    <a:srgbClr val="000000">
+                      <a:alpha val="60000"/>
+                    </a:srgbClr>
+                  </a:innerShdw>
+                </a:effectLst>
+              </a:rPr>
+              <a:t>Feel The </a:t>
+            </a:r>
+            <a:r>
+              <a:rPr lang="en-US" sz="4000" b="1" spc="50" dirty="0" err="1" smtClean="0">
+                <a:ln w="13500">
+                  <a:solidFill>
+                    <a:schemeClr val="accent1">
+                      <a:shade val="2500"/>
+                      <a:alpha val="6500"/>
+                    </a:schemeClr>
+                  </a:solidFill>
+                  <a:prstDash val="solid"/>
+                </a:ln>
+                <a:solidFill>
+                  <a:schemeClr val="accent1">
+                    <a:tint val="3000"/>
+                    <a:alpha val="95000"/>
+                  </a:schemeClr>
+                </a:solidFill>
+                <a:effectLst>
+                  <a:innerShdw blurRad="50900" dist="38500" dir="13500000">
+                    <a:srgbClr val="000000">
+                      <a:alpha val="60000"/>
+                    </a:srgbClr>
+                  </a:innerShdw>
+                </a:effectLst>
+              </a:rPr>
+              <a:t>Func</a:t>
+            </a:r>
+            <a:r>
+              <a:rPr lang="en-US" sz="4000" b="1" spc="50" dirty="0" smtClean="0">
+                <a:ln w="13500">
+                  <a:solidFill>
+                    <a:schemeClr val="accent1">
+                      <a:shade val="2500"/>
+                      <a:alpha val="6500"/>
+                    </a:schemeClr>
+                  </a:solidFill>
+                  <a:prstDash val="solid"/>
+                </a:ln>
+                <a:solidFill>
+                  <a:schemeClr val="accent1">
+                    <a:tint val="3000"/>
+                    <a:alpha val="95000"/>
+                  </a:schemeClr>
+                </a:solidFill>
+                <a:effectLst>
+                  <a:innerShdw blurRad="50900" dist="38500" dir="13500000">
+                    <a:srgbClr val="000000">
+                      <a:alpha val="60000"/>
+                    </a:srgbClr>
+                  </a:innerShdw>
+                </a:effectLst>
+              </a:rPr>
+              <a:t> Podcast</a:t>
+            </a:r>
+          </a:p>
+          <a:p>
+            <a:pPr algn="ctr"/>
+            <a:r>
+              <a:rPr lang="en-US" sz="4000" b="1" spc="50" dirty="0" smtClean="0">
+                <a:ln w="13500">
+                  <a:solidFill>
+                    <a:schemeClr val="accent1">
+                      <a:shade val="2500"/>
+                      <a:alpha val="6500"/>
+                    </a:schemeClr>
+                  </a:solidFill>
+                  <a:prstDash val="solid"/>
+                </a:ln>
+                <a:solidFill>
+                  <a:schemeClr val="accent1">
+                    <a:tint val="3000"/>
+                    <a:alpha val="95000"/>
+                  </a:schemeClr>
+                </a:solidFill>
+                <a:effectLst>
+                  <a:innerShdw blurRad="50900" dist="38500" dir="13500000">
+                    <a:srgbClr val="000000">
+                      <a:alpha val="60000"/>
+                    </a:srgbClr>
+                  </a:innerShdw>
+                </a:effectLst>
+              </a:rPr>
+              <a:t>F</a:t>
+            </a:r>
+            <a:r>
+              <a:rPr lang="en-US" sz="4000" b="1" cap="none" spc="50" dirty="0" smtClean="0">
+                <a:ln w="13500">
+                  <a:solidFill>
+                    <a:schemeClr val="accent1">
+                      <a:shade val="2500"/>
+                      <a:alpha val="6500"/>
+                    </a:schemeClr>
+                  </a:solidFill>
+                  <a:prstDash val="solid"/>
+                </a:ln>
+                <a:solidFill>
+                  <a:schemeClr val="accent1">
+                    <a:tint val="3000"/>
+                    <a:alpha val="95000"/>
+                  </a:schemeClr>
+                </a:solidFill>
+                <a:effectLst>
+                  <a:innerShdw blurRad="50900" dist="38500" dir="13500000">
+                    <a:srgbClr val="000000">
+                      <a:alpha val="60000"/>
+                    </a:srgbClr>
+                  </a:innerShdw>
+                </a:effectLst>
+              </a:rPr>
+              <a:t>eelTheFunc.com</a:t>
+            </a:r>
+            <a:endParaRPr lang="en-US" sz="2800" b="1" cap="none" spc="50" dirty="0">
+              <a:ln w="13500">
+                <a:solidFill>
+                  <a:schemeClr val="accent1">
+                    <a:shade val="2500"/>
+                    <a:alpha val="6500"/>
+                  </a:schemeClr>
+                </a:solidFill>
+                <a:prstDash val="solid"/>
+              </a:ln>
+              <a:solidFill>
+                <a:schemeClr val="accent1">
+                  <a:tint val="3000"/>
+                  <a:alpha val="95000"/>
+                </a:schemeClr>
+              </a:solidFill>
+              <a:effectLst>
+                <a:innerShdw blurRad="50900" dist="38500" dir="13500000">
+                  <a:srgbClr val="000000">
+                    <a:alpha val="60000"/>
+                  </a:srgbClr>
+                </a:innerShdw>
+              </a:effectLst>
+            </a:endParaRPr>
+          </a:p>
+        </p:txBody>
+      </p:sp>
+    </p:spTree>
+  </p:cSld>
+  <p:clrMapOvr>
+    <a:masterClrMapping/>
+  </p:clrMapOvr>
+  <p:transition/>
+  <p:timing>
+    <p:tnLst>
+      <p:par>
+        <p:cTn id="1" dur="indefinite" restart="never" nodeType="tmRoot"/>
+      </p:par>
+    </p:tnLst>
+  </p:timing>
+</p:sld>
+</file>
+
+<file path=ppt/slides/slide3.xml><?xml version="1.0" encoding="utf-8"?>
+<p:sld xmlns:a="http://schemas.openxmlformats.org/drawingml/2006/main" xmlns:r="http://schemas.openxmlformats.org/officeDocument/2006/relationships" xmlns:p="http://schemas.openxmlformats.org/presentationml/2006/main">
+  <p:cSld>
+    <p:bg>
+      <p:bgPr>
+        <a:solidFill>
+          <a:schemeClr val="tx1"/>
+        </a:solidFill>
+        <a:effectLst/>
+      </p:bgPr>
+    </p:bg>
+    <p:spTree>
+      <p:nvGrpSpPr>
+        <p:cNvPr id="1" name=""/>
+        <p:cNvGrpSpPr/>
+        <p:nvPr/>
+      </p:nvGrpSpPr>
+      <p:grpSpPr>
+        <a:xfrm>
+          <a:off x="0" y="0"/>
+          <a:ext cx="0" cy="0"/>
+          <a:chOff x="0" y="0"/>
+          <a:chExt cx="0" cy="0"/>
+        </a:xfrm>
+      </p:grpSpPr>
+      <p:pic>
+        <p:nvPicPr>
+          <p:cNvPr id="2051" name="Picture 3"/>
+          <p:cNvPicPr>
+            <a:picLocks noChangeAspect="1" noChangeArrowheads="1"/>
+          </p:cNvPicPr>
+          <p:nvPr/>
+        </p:nvPicPr>
+        <p:blipFill>
+          <a:blip r:embed="rId2" cstate="print"/>
+          <a:srcRect/>
+          <a:stretch>
+            <a:fillRect/>
+          </a:stretch>
+        </p:blipFill>
+        <p:spPr bwMode="auto">
+          <a:xfrm>
+            <a:off x="228600" y="152400"/>
+            <a:ext cx="2133600" cy="2133600"/>
+          </a:xfrm>
+          <a:prstGeom prst="rect">
+            <a:avLst/>
+          </a:prstGeom>
+          <a:noFill/>
+          <a:ln w="9525">
+            <a:noFill/>
+            <a:miter lim="800000"/>
+            <a:headEnd/>
+            <a:tailEnd/>
+          </a:ln>
+        </p:spPr>
+      </p:pic>
+      <p:pic>
+        <p:nvPicPr>
+          <p:cNvPr id="2052" name="Picture 4"/>
+          <p:cNvPicPr>
+            <a:picLocks noChangeAspect="1" noChangeArrowheads="1"/>
+          </p:cNvPicPr>
+          <p:nvPr/>
+        </p:nvPicPr>
+        <p:blipFill>
+          <a:blip r:embed="rId3" cstate="print"/>
+          <a:srcRect/>
+          <a:stretch>
+            <a:fillRect/>
+          </a:stretch>
+        </p:blipFill>
+        <p:spPr bwMode="auto">
+          <a:xfrm>
+            <a:off x="6791325" y="4505325"/>
+            <a:ext cx="2190750" cy="2190750"/>
+          </a:xfrm>
+          <a:prstGeom prst="rect">
+            <a:avLst/>
+          </a:prstGeom>
+          <a:noFill/>
+          <a:ln w="9525">
+            <a:noFill/>
+            <a:miter lim="800000"/>
+            <a:headEnd/>
+            <a:tailEnd/>
+          </a:ln>
+        </p:spPr>
+      </p:pic>
+      <p:pic>
+        <p:nvPicPr>
+          <p:cNvPr id="2053" name="Picture 5"/>
+          <p:cNvPicPr>
+            <a:picLocks noChangeAspect="1" noChangeArrowheads="1"/>
+          </p:cNvPicPr>
+          <p:nvPr/>
+        </p:nvPicPr>
+        <p:blipFill>
+          <a:blip r:embed="rId4" cstate="print"/>
+          <a:srcRect/>
+          <a:stretch>
+            <a:fillRect/>
+          </a:stretch>
+        </p:blipFill>
+        <p:spPr bwMode="auto">
+          <a:xfrm>
+            <a:off x="228600" y="4267200"/>
+            <a:ext cx="2428875" cy="2428875"/>
+          </a:xfrm>
+          <a:prstGeom prst="rect">
+            <a:avLst/>
+          </a:prstGeom>
+          <a:noFill/>
+          <a:ln w="9525">
+            <a:noFill/>
+            <a:miter lim="800000"/>
+            <a:headEnd/>
+            <a:tailEnd/>
+          </a:ln>
+        </p:spPr>
+      </p:pic>
+      <p:pic>
+        <p:nvPicPr>
+          <p:cNvPr id="2050" name="Picture 2"/>
+          <p:cNvPicPr>
+            <a:picLocks noChangeAspect="1" noChangeArrowheads="1"/>
+          </p:cNvPicPr>
+          <p:nvPr/>
+        </p:nvPicPr>
+        <p:blipFill>
+          <a:blip r:embed="rId5" cstate="print"/>
+          <a:srcRect/>
+          <a:stretch>
+            <a:fillRect/>
+          </a:stretch>
+        </p:blipFill>
+        <p:spPr bwMode="auto">
+          <a:xfrm>
+            <a:off x="2667000" y="1447800"/>
+            <a:ext cx="3989943" cy="3916363"/>
+          </a:xfrm>
+          <a:prstGeom prst="rect">
+            <a:avLst/>
+          </a:prstGeom>
+          <a:noFill/>
+          <a:ln w="9525">
+            <a:noFill/>
+            <a:miter lim="800000"/>
+            <a:headEnd/>
+            <a:tailEnd/>
+          </a:ln>
+          <a:effectLst/>
+        </p:spPr>
+      </p:pic>
+      <p:pic>
+        <p:nvPicPr>
+          <p:cNvPr id="2055" name="Picture 7"/>
+          <p:cNvPicPr>
+            <a:picLocks noChangeAspect="1" noChangeArrowheads="1"/>
+          </p:cNvPicPr>
+          <p:nvPr/>
+        </p:nvPicPr>
+        <p:blipFill>
+          <a:blip r:embed="rId6" cstate="print"/>
+          <a:srcRect/>
+          <a:stretch>
+            <a:fillRect/>
+          </a:stretch>
+        </p:blipFill>
+        <p:spPr bwMode="auto">
+          <a:xfrm>
+            <a:off x="7010400" y="152400"/>
+            <a:ext cx="1971675" cy="1971675"/>
+          </a:xfrm>
+          <a:prstGeom prst="rect">
+            <a:avLst/>
+          </a:prstGeom>
+          <a:noFill/>
+          <a:ln w="9525">
+            <a:noFill/>
+            <a:miter lim="800000"/>
+            <a:headEnd/>
+            <a:tailEnd/>
+          </a:ln>
+        </p:spPr>
+      </p:pic>
+    </p:spTree>
+  </p:cSld>
+  <p:clrMapOvr>
+    <a:masterClrMapping/>
+  </p:clrMapOvr>
+  <p:timing>
+    <p:tnLst>
+      <p:par>
+        <p:cTn id="1" dur="indefinite" restart="never" nodeType="tmRoot"/>
+      </p:par>
+    </p:tnLst>
+  </p:timing>
+</p:sld>
+</file>
+
+<file path=ppt/slides/slide4.xml><?xml version="1.0" encoding="utf-8"?>
 <p:sld xmlns:a="http://schemas.openxmlformats.org/drawingml/2006/main" xmlns:r="http://schemas.openxmlformats.org/officeDocument/2006/relationships" xmlns:p="http://schemas.openxmlformats.org/presentationml/2006/main">
   <p:cSld>
     <p:bg>
@@ -7037,7 +7890,7 @@
 </p:sld>
 </file>
 
-<file path=ppt/slides/slide3.xml><?xml version="1.0" encoding="utf-8"?>
+<file path=ppt/slides/slide5.xml><?xml version="1.0" encoding="utf-8"?>
 <p:sld xmlns:a="http://schemas.openxmlformats.org/drawingml/2006/main" xmlns:r="http://schemas.openxmlformats.org/officeDocument/2006/relationships" xmlns:p="http://schemas.openxmlformats.org/presentationml/2006/main">
   <p:cSld>
     <p:spTree>

</xml_diff>